<commit_message>
Corrected the minor spelling error for git commit and git status
</commit_message>
<xml_diff>
--- a/powerpoints/git-github.pptx
+++ b/powerpoints/git-github.pptx
@@ -5071,7 +5071,7 @@
           <p:nvPr>
             <p:extLst>
               <p:ext uri="{D42A27DB-BD31-4B8C-83A1-F6EECF244321}">
-                <p14:modId xmlns:p14="http://schemas.microsoft.com/office/powerpoint/2010/main" val="2545480069"/>
+                <p14:modId xmlns:p14="http://schemas.microsoft.com/office/powerpoint/2010/main" val="3379755922"/>
               </p:ext>
             </p:extLst>
           </p:nvPr>
@@ -5651,7 +5651,7 @@
                           <a:cs typeface="+mn-cs"/>
                           <a:sym typeface="Helvetica Light"/>
                         </a:rPr>
-                        <a:t>get commit -m &lt;"message"&gt;</a:t>
+                        <a:t>git commit -m &lt;"message"&gt;</a:t>
                       </a:r>
                     </a:p>
                   </a:txBody>
@@ -5754,7 +5754,7 @@
                           <a:cs typeface="+mn-cs"/>
                           <a:sym typeface="Helvetica Light"/>
                         </a:rPr>
-                        <a:t>get status</a:t>
+                        <a:t>git status</a:t>
                       </a:r>
                     </a:p>
                   </a:txBody>

</xml_diff>